<commit_message>
Another kind of magic
</commit_message>
<xml_diff>
--- a/Проект pygame -- презентация.pptx
+++ b/Проект pygame -- презентация.pptx
@@ -3676,7 +3676,7 @@
     </p:spTree>
     <p:extLst>
       <p:ext uri="{BB962C8B-B14F-4D97-AF65-F5344CB8AC3E}">
-        <p14:creationId xmlns:p14="http://schemas.microsoft.com/office/powerpoint/2010/main" xmlns="" val="4164323062"/>
+        <p14:creationId xmlns="" xmlns:p14="http://schemas.microsoft.com/office/powerpoint/2010/main" val="4164323062"/>
       </p:ext>
     </p:extLst>
   </p:cSld>
@@ -3781,7 +3781,7 @@
           <a:blip r:embed="rId2">
             <a:extLst>
               <a:ext uri="{28A0092B-C50C-407E-A947-70E740481C1C}">
-                <a14:useLocalDpi xmlns:a14="http://schemas.microsoft.com/office/drawing/2010/main" xmlns="" val="0"/>
+                <a14:useLocalDpi xmlns="" xmlns:a14="http://schemas.microsoft.com/office/drawing/2010/main" val="0"/>
               </a:ext>
             </a:extLst>
           </a:blip>
@@ -3802,7 +3802,7 @@
     </p:spTree>
     <p:extLst>
       <p:ext uri="{BB962C8B-B14F-4D97-AF65-F5344CB8AC3E}">
-        <p14:creationId xmlns:p14="http://schemas.microsoft.com/office/powerpoint/2010/main" xmlns="" val="2777145316"/>
+        <p14:creationId xmlns="" xmlns:p14="http://schemas.microsoft.com/office/powerpoint/2010/main" val="2777145316"/>
       </p:ext>
     </p:extLst>
   </p:cSld>
@@ -3884,51 +3884,19 @@
             </a:r>
             <a:r>
               <a:rPr lang="en-US" dirty="0" smtClean="0"/>
-              <a:t>Particle. </a:t>
+              <a:t>Particle</a:t>
+            </a:r>
+            <a:r>
+              <a:rPr lang="en-US" smtClean="0"/>
+              <a:t>. </a:t>
+            </a:r>
+            <a:r>
+              <a:rPr lang="ru-RU" smtClean="0"/>
+              <a:t>Также</a:t>
             </a:r>
             <a:r>
               <a:rPr lang="ru-RU" dirty="0" smtClean="0"/>
-              <a:t>Игрок управляет объектом класса </a:t>
-            </a:r>
-            <a:r>
-              <a:rPr lang="en-US" dirty="0" smtClean="0"/>
-              <a:t>Player</a:t>
-            </a:r>
-            <a:r>
-              <a:rPr lang="ru-RU" dirty="0" smtClean="0"/>
-              <a:t>, его задача – не врезаться в деревья (</a:t>
-            </a:r>
-            <a:r>
-              <a:rPr lang="en-US" dirty="0" smtClean="0"/>
-              <a:t>Tree</a:t>
-            </a:r>
-            <a:r>
-              <a:rPr lang="ru-RU" dirty="0" smtClean="0"/>
-              <a:t>)</a:t>
-            </a:r>
-            <a:r>
-              <a:rPr lang="en-US" dirty="0" smtClean="0"/>
-              <a:t>. </a:t>
-            </a:r>
-            <a:r>
-              <a:rPr lang="ru-RU" dirty="0" smtClean="0"/>
-              <a:t>При въезде в ворота начисляется много очков и выпускается салют, являющий собой систему частиц (</a:t>
-            </a:r>
-            <a:r>
-              <a:rPr lang="en-US" dirty="0" smtClean="0"/>
-              <a:t>Particle</a:t>
-            </a:r>
-            <a:r>
-              <a:rPr lang="ru-RU" dirty="0" smtClean="0"/>
-              <a:t>)</a:t>
-            </a:r>
-            <a:r>
-              <a:rPr lang="en-US" dirty="0" smtClean="0"/>
-              <a:t>. </a:t>
-            </a:r>
-            <a:r>
-              <a:rPr lang="ru-RU" dirty="0" smtClean="0"/>
-              <a:t>Также, при выходе из игры рекорд сохраняется в файл, а при её запуске – читается из файла. В процессе создания игры были использованы библиотека </a:t>
+              <a:t>, при выходе из игры рекорд сохраняется в файл, а при её запуске – читается из файла. В процессе создания игры были использованы библиотека </a:t>
             </a:r>
             <a:r>
               <a:rPr lang="en-US" dirty="0" err="1" smtClean="0"/>
@@ -3957,7 +3925,7 @@
     </p:spTree>
     <p:extLst>
       <p:ext uri="{BB962C8B-B14F-4D97-AF65-F5344CB8AC3E}">
-        <p14:creationId xmlns:p14="http://schemas.microsoft.com/office/powerpoint/2010/main" xmlns="" val="1920638025"/>
+        <p14:creationId xmlns="" xmlns:p14="http://schemas.microsoft.com/office/powerpoint/2010/main" val="1920638025"/>
       </p:ext>
     </p:extLst>
   </p:cSld>
@@ -4036,7 +4004,7 @@
     </p:spTree>
     <p:extLst>
       <p:ext uri="{BB962C8B-B14F-4D97-AF65-F5344CB8AC3E}">
-        <p14:creationId xmlns:p14="http://schemas.microsoft.com/office/powerpoint/2010/main" xmlns="" val="214456079"/>
+        <p14:creationId xmlns="" xmlns:p14="http://schemas.microsoft.com/office/powerpoint/2010/main" val="214456079"/>
       </p:ext>
     </p:extLst>
   </p:cSld>

</xml_diff>